<commit_message>
minor updates to intro lecture
</commit_message>
<xml_diff>
--- a/assets/lectures/cbw-cshl/2019/full/RNASeq_Module7_Lecture.pptx
+++ b/assets/lectures/cbw-cshl/2019/full/RNASeq_Module7_Lecture.pptx
@@ -234,7 +234,7 @@
           <a:p>
             <a:fld id="{30F8F387-D55B-1842-958C-A26E6CD2D34E}" type="datetimeFigureOut">
               <a:rPr lang="en-US" smtClean="0"/>
-              <a:t>2/25/19</a:t>
+              <a:t>3/12/19</a:t>
             </a:fld>
             <a:endParaRPr lang="en-US"/>
           </a:p>
@@ -540,14 +540,14 @@
           </a:ln>
           <a:extLst>
             <a:ext uri="{909E8E84-426E-40dd-AFC4-6F175D3DCCD1}">
-              <a14:hiddenFill xmlns:a14="http://schemas.microsoft.com/office/drawing/2010/main" xmlns="">
+              <a14:hiddenFill xmlns="" xmlns:a14="http://schemas.microsoft.com/office/drawing/2010/main">
                 <a:solidFill>
                   <a:srgbClr val="FFFFFF"/>
                 </a:solidFill>
               </a14:hiddenFill>
             </a:ext>
             <a:ext uri="{FAA26D3D-D897-4be2-8F04-BA451C77F1D7}">
-              <ma14:placeholderFlag xmlns:ma14="http://schemas.microsoft.com/office/mac/drawingml/2011/main" xmlns="" val="1"/>
+              <ma14:placeholderFlag xmlns="" xmlns:ma14="http://schemas.microsoft.com/office/mac/drawingml/2011/main" val="1"/>
             </a:ext>
           </a:extLst>
         </p:spPr>
@@ -566,14 +566,14 @@
           <a:noFill/>
           <a:extLst>
             <a:ext uri="{909E8E84-426E-40dd-AFC4-6F175D3DCCD1}">
-              <a14:hiddenFill xmlns:a14="http://schemas.microsoft.com/office/drawing/2010/main" xmlns="">
+              <a14:hiddenFill xmlns="" xmlns:a14="http://schemas.microsoft.com/office/drawing/2010/main">
                 <a:solidFill>
                   <a:srgbClr val="FFFFFF"/>
                 </a:solidFill>
               </a14:hiddenFill>
             </a:ext>
             <a:ext uri="{91240B29-F687-4f45-9708-019B960494DF}">
-              <a14:hiddenLine xmlns:a14="http://schemas.microsoft.com/office/drawing/2010/main" xmlns="" w="9525">
+              <a14:hiddenLine xmlns="" xmlns:a14="http://schemas.microsoft.com/office/drawing/2010/main" w="9525">
                 <a:solidFill>
                   <a:srgbClr val="000000"/>
                 </a:solidFill>
@@ -583,7 +583,7 @@
               </a14:hiddenLine>
             </a:ext>
             <a:ext uri="{FAA26D3D-D897-4be2-8F04-BA451C77F1D7}">
-              <ma14:placeholderFlag xmlns:ma14="http://schemas.microsoft.com/office/mac/drawingml/2011/main" xmlns="" val="1"/>
+              <ma14:placeholderFlag xmlns="" xmlns:ma14="http://schemas.microsoft.com/office/mac/drawingml/2011/main" val="1"/>
             </a:ext>
           </a:extLst>
         </p:spPr>
@@ -617,14 +617,14 @@
           <a:noFill/>
           <a:extLst>
             <a:ext uri="{909E8E84-426E-40dd-AFC4-6F175D3DCCD1}">
-              <a14:hiddenFill xmlns:a14="http://schemas.microsoft.com/office/drawing/2010/main" xmlns="">
+              <a14:hiddenFill xmlns="" xmlns:a14="http://schemas.microsoft.com/office/drawing/2010/main">
                 <a:solidFill>
                   <a:srgbClr val="FFFFFF"/>
                 </a:solidFill>
               </a14:hiddenFill>
             </a:ext>
             <a:ext uri="{91240B29-F687-4f45-9708-019B960494DF}">
-              <a14:hiddenLine xmlns:a14="http://schemas.microsoft.com/office/drawing/2010/main" xmlns="" w="9525">
+              <a14:hiddenLine xmlns="" xmlns:a14="http://schemas.microsoft.com/office/drawing/2010/main" w="9525">
                 <a:solidFill>
                   <a:srgbClr val="000000"/>
                 </a:solidFill>
@@ -804,14 +804,14 @@
           <a:noFill/>
           <a:extLst>
             <a:ext uri="{909E8E84-426E-40dd-AFC4-6F175D3DCCD1}">
-              <a14:hiddenFill xmlns:a14="http://schemas.microsoft.com/office/drawing/2010/main" xmlns="">
+              <a14:hiddenFill xmlns="" xmlns:a14="http://schemas.microsoft.com/office/drawing/2010/main">
                 <a:solidFill>
                   <a:srgbClr val="FFFFFF"/>
                 </a:solidFill>
               </a14:hiddenFill>
             </a:ext>
             <a:ext uri="{91240B29-F687-4f45-9708-019B960494DF}">
-              <a14:hiddenLine xmlns:a14="http://schemas.microsoft.com/office/drawing/2010/main" xmlns="" w="9525">
+              <a14:hiddenLine xmlns="" xmlns:a14="http://schemas.microsoft.com/office/drawing/2010/main" w="9525">
                 <a:solidFill>
                   <a:srgbClr val="000000"/>
                 </a:solidFill>
@@ -971,7 +971,7 @@
           </a:ln>
           <a:extLst>
             <a:ext uri="{FAA26D3D-D897-4be2-8F04-BA451C77F1D7}">
-              <ma14:placeholderFlag xmlns:ma14="http://schemas.microsoft.com/office/mac/drawingml/2011/main" xmlns="" val="1"/>
+              <ma14:placeholderFlag xmlns="" xmlns:ma14="http://schemas.microsoft.com/office/mac/drawingml/2011/main" val="1"/>
             </a:ext>
           </a:extLst>
         </p:spPr>
@@ -1000,7 +1000,7 @@
           </a:ln>
           <a:extLst>
             <a:ext uri="{FAA26D3D-D897-4be2-8F04-BA451C77F1D7}">
-              <ma14:placeholderFlag xmlns:ma14="http://schemas.microsoft.com/office/mac/drawingml/2011/main" xmlns="" val="1"/>
+              <ma14:placeholderFlag xmlns="" xmlns:ma14="http://schemas.microsoft.com/office/mac/drawingml/2011/main" val="1"/>
             </a:ext>
           </a:extLst>
         </p:spPr>
@@ -1065,14 +1065,14 @@
           <a:noFill/>
           <a:extLst>
             <a:ext uri="{909E8E84-426E-40dd-AFC4-6F175D3DCCD1}">
-              <a14:hiddenFill xmlns:a14="http://schemas.microsoft.com/office/drawing/2010/main" xmlns="">
+              <a14:hiddenFill xmlns="" xmlns:a14="http://schemas.microsoft.com/office/drawing/2010/main">
                 <a:solidFill>
                   <a:srgbClr val="FFFFFF"/>
                 </a:solidFill>
               </a14:hiddenFill>
             </a:ext>
             <a:ext uri="{91240B29-F687-4f45-9708-019B960494DF}">
-              <a14:hiddenLine xmlns:a14="http://schemas.microsoft.com/office/drawing/2010/main" xmlns="" w="9525">
+              <a14:hiddenLine xmlns="" xmlns:a14="http://schemas.microsoft.com/office/drawing/2010/main" w="9525">
                 <a:solidFill>
                   <a:srgbClr val="000000"/>
                 </a:solidFill>
@@ -1232,7 +1232,7 @@
           </a:ln>
           <a:extLst>
             <a:ext uri="{FAA26D3D-D897-4be2-8F04-BA451C77F1D7}">
-              <ma14:placeholderFlag xmlns:ma14="http://schemas.microsoft.com/office/mac/drawingml/2011/main" xmlns="" val="1"/>
+              <ma14:placeholderFlag xmlns="" xmlns:ma14="http://schemas.microsoft.com/office/mac/drawingml/2011/main" val="1"/>
             </a:ext>
           </a:extLst>
         </p:spPr>
@@ -1261,7 +1261,7 @@
           </a:ln>
           <a:extLst>
             <a:ext uri="{FAA26D3D-D897-4be2-8F04-BA451C77F1D7}">
-              <ma14:placeholderFlag xmlns:ma14="http://schemas.microsoft.com/office/mac/drawingml/2011/main" xmlns="" val="1"/>
+              <ma14:placeholderFlag xmlns="" xmlns:ma14="http://schemas.microsoft.com/office/mac/drawingml/2011/main" val="1"/>
             </a:ext>
           </a:extLst>
         </p:spPr>
@@ -1326,14 +1326,14 @@
           <a:noFill/>
           <a:extLst>
             <a:ext uri="{909E8E84-426E-40dd-AFC4-6F175D3DCCD1}">
-              <a14:hiddenFill xmlns:a14="http://schemas.microsoft.com/office/drawing/2010/main" xmlns="">
+              <a14:hiddenFill xmlns="" xmlns:a14="http://schemas.microsoft.com/office/drawing/2010/main">
                 <a:solidFill>
                   <a:srgbClr val="FFFFFF"/>
                 </a:solidFill>
               </a14:hiddenFill>
             </a:ext>
             <a:ext uri="{91240B29-F687-4f45-9708-019B960494DF}">
-              <a14:hiddenLine xmlns:a14="http://schemas.microsoft.com/office/drawing/2010/main" xmlns="" w="9525">
+              <a14:hiddenLine xmlns="" xmlns:a14="http://schemas.microsoft.com/office/drawing/2010/main" w="9525">
                 <a:solidFill>
                   <a:srgbClr val="000000"/>
                 </a:solidFill>
@@ -1493,7 +1493,7 @@
           </a:ln>
           <a:extLst>
             <a:ext uri="{FAA26D3D-D897-4be2-8F04-BA451C77F1D7}">
-              <ma14:placeholderFlag xmlns:ma14="http://schemas.microsoft.com/office/mac/drawingml/2011/main" xmlns="" val="1"/>
+              <ma14:placeholderFlag xmlns="" xmlns:ma14="http://schemas.microsoft.com/office/mac/drawingml/2011/main" val="1"/>
             </a:ext>
           </a:extLst>
         </p:spPr>
@@ -1522,7 +1522,7 @@
           </a:ln>
           <a:extLst>
             <a:ext uri="{FAA26D3D-D897-4be2-8F04-BA451C77F1D7}">
-              <ma14:placeholderFlag xmlns:ma14="http://schemas.microsoft.com/office/mac/drawingml/2011/main" xmlns="" val="1"/>
+              <ma14:placeholderFlag xmlns="" xmlns:ma14="http://schemas.microsoft.com/office/mac/drawingml/2011/main" val="1"/>
             </a:ext>
           </a:extLst>
         </p:spPr>
@@ -1587,14 +1587,14 @@
           <a:noFill/>
           <a:extLst>
             <a:ext uri="{909E8E84-426E-40dd-AFC4-6F175D3DCCD1}">
-              <a14:hiddenFill xmlns:a14="http://schemas.microsoft.com/office/drawing/2010/main" xmlns="">
+              <a14:hiddenFill xmlns="" xmlns:a14="http://schemas.microsoft.com/office/drawing/2010/main">
                 <a:solidFill>
                   <a:srgbClr val="FFFFFF"/>
                 </a:solidFill>
               </a14:hiddenFill>
             </a:ext>
             <a:ext uri="{91240B29-F687-4f45-9708-019B960494DF}">
-              <a14:hiddenLine xmlns:a14="http://schemas.microsoft.com/office/drawing/2010/main" xmlns="" w="9525">
+              <a14:hiddenLine xmlns="" xmlns:a14="http://schemas.microsoft.com/office/drawing/2010/main" w="9525">
                 <a:solidFill>
                   <a:srgbClr val="000000"/>
                 </a:solidFill>
@@ -1754,7 +1754,7 @@
           </a:ln>
           <a:extLst>
             <a:ext uri="{FAA26D3D-D897-4be2-8F04-BA451C77F1D7}">
-              <ma14:placeholderFlag xmlns:ma14="http://schemas.microsoft.com/office/mac/drawingml/2011/main" xmlns="" val="1"/>
+              <ma14:placeholderFlag xmlns="" xmlns:ma14="http://schemas.microsoft.com/office/mac/drawingml/2011/main" val="1"/>
             </a:ext>
           </a:extLst>
         </p:spPr>
@@ -1783,7 +1783,7 @@
           </a:ln>
           <a:extLst>
             <a:ext uri="{FAA26D3D-D897-4be2-8F04-BA451C77F1D7}">
-              <ma14:placeholderFlag xmlns:ma14="http://schemas.microsoft.com/office/mac/drawingml/2011/main" xmlns="" val="1"/>
+              <ma14:placeholderFlag xmlns="" xmlns:ma14="http://schemas.microsoft.com/office/mac/drawingml/2011/main" val="1"/>
             </a:ext>
           </a:extLst>
         </p:spPr>
@@ -1848,14 +1848,14 @@
           <a:noFill/>
           <a:extLst>
             <a:ext uri="{909E8E84-426E-40dd-AFC4-6F175D3DCCD1}">
-              <a14:hiddenFill xmlns:a14="http://schemas.microsoft.com/office/drawing/2010/main" xmlns="">
+              <a14:hiddenFill xmlns="" xmlns:a14="http://schemas.microsoft.com/office/drawing/2010/main">
                 <a:solidFill>
                   <a:srgbClr val="FFFFFF"/>
                 </a:solidFill>
               </a14:hiddenFill>
             </a:ext>
             <a:ext uri="{91240B29-F687-4f45-9708-019B960494DF}">
-              <a14:hiddenLine xmlns:a14="http://schemas.microsoft.com/office/drawing/2010/main" xmlns="" w="9525">
+              <a14:hiddenLine xmlns="" xmlns:a14="http://schemas.microsoft.com/office/drawing/2010/main" w="9525">
                 <a:solidFill>
                   <a:srgbClr val="000000"/>
                 </a:solidFill>
@@ -2015,7 +2015,7 @@
           </a:ln>
           <a:extLst>
             <a:ext uri="{FAA26D3D-D897-4be2-8F04-BA451C77F1D7}">
-              <ma14:placeholderFlag xmlns:ma14="http://schemas.microsoft.com/office/mac/drawingml/2011/main" xmlns="" val="1"/>
+              <ma14:placeholderFlag xmlns="" xmlns:ma14="http://schemas.microsoft.com/office/mac/drawingml/2011/main" val="1"/>
             </a:ext>
           </a:extLst>
         </p:spPr>
@@ -2044,7 +2044,7 @@
           </a:ln>
           <a:extLst>
             <a:ext uri="{FAA26D3D-D897-4be2-8F04-BA451C77F1D7}">
-              <ma14:placeholderFlag xmlns:ma14="http://schemas.microsoft.com/office/mac/drawingml/2011/main" xmlns="" val="1"/>
+              <ma14:placeholderFlag xmlns="" xmlns:ma14="http://schemas.microsoft.com/office/mac/drawingml/2011/main" val="1"/>
             </a:ext>
           </a:extLst>
         </p:spPr>
@@ -2193,14 +2193,14 @@
           <a:noFill/>
           <a:extLst>
             <a:ext uri="{909E8E84-426E-40dd-AFC4-6F175D3DCCD1}">
-              <a14:hiddenFill xmlns:a14="http://schemas.microsoft.com/office/drawing/2010/main" xmlns="">
+              <a14:hiddenFill xmlns="" xmlns:a14="http://schemas.microsoft.com/office/drawing/2010/main">
                 <a:solidFill>
                   <a:srgbClr val="FFFFFF"/>
                 </a:solidFill>
               </a14:hiddenFill>
             </a:ext>
             <a:ext uri="{91240B29-F687-4f45-9708-019B960494DF}">
-              <a14:hiddenLine xmlns:a14="http://schemas.microsoft.com/office/drawing/2010/main" xmlns="" w="9525">
+              <a14:hiddenLine xmlns="" xmlns:a14="http://schemas.microsoft.com/office/drawing/2010/main" w="9525">
                 <a:solidFill>
                   <a:srgbClr val="000000"/>
                 </a:solidFill>
@@ -2360,7 +2360,7 @@
           </a:ln>
           <a:extLst>
             <a:ext uri="{FAA26D3D-D897-4be2-8F04-BA451C77F1D7}">
-              <ma14:placeholderFlag xmlns:ma14="http://schemas.microsoft.com/office/mac/drawingml/2011/main" xmlns="" val="1"/>
+              <ma14:placeholderFlag xmlns="" xmlns:ma14="http://schemas.microsoft.com/office/mac/drawingml/2011/main" val="1"/>
             </a:ext>
           </a:extLst>
         </p:spPr>
@@ -2389,7 +2389,7 @@
           </a:ln>
           <a:extLst>
             <a:ext uri="{FAA26D3D-D897-4be2-8F04-BA451C77F1D7}">
-              <ma14:placeholderFlag xmlns:ma14="http://schemas.microsoft.com/office/mac/drawingml/2011/main" xmlns="" val="1"/>
+              <ma14:placeholderFlag xmlns="" xmlns:ma14="http://schemas.microsoft.com/office/mac/drawingml/2011/main" val="1"/>
             </a:ext>
           </a:extLst>
         </p:spPr>
@@ -2454,14 +2454,14 @@
           <a:noFill/>
           <a:extLst>
             <a:ext uri="{909E8E84-426E-40dd-AFC4-6F175D3DCCD1}">
-              <a14:hiddenFill xmlns:a14="http://schemas.microsoft.com/office/drawing/2010/main" xmlns="">
+              <a14:hiddenFill xmlns="" xmlns:a14="http://schemas.microsoft.com/office/drawing/2010/main">
                 <a:solidFill>
                   <a:srgbClr val="FFFFFF"/>
                 </a:solidFill>
               </a14:hiddenFill>
             </a:ext>
             <a:ext uri="{91240B29-F687-4f45-9708-019B960494DF}">
-              <a14:hiddenLine xmlns:a14="http://schemas.microsoft.com/office/drawing/2010/main" xmlns="" w="9525">
+              <a14:hiddenLine xmlns="" xmlns:a14="http://schemas.microsoft.com/office/drawing/2010/main" w="9525">
                 <a:solidFill>
                   <a:srgbClr val="000000"/>
                 </a:solidFill>
@@ -2621,7 +2621,7 @@
           </a:ln>
           <a:extLst>
             <a:ext uri="{FAA26D3D-D897-4be2-8F04-BA451C77F1D7}">
-              <ma14:placeholderFlag xmlns:ma14="http://schemas.microsoft.com/office/mac/drawingml/2011/main" xmlns="" val="1"/>
+              <ma14:placeholderFlag xmlns="" xmlns:ma14="http://schemas.microsoft.com/office/mac/drawingml/2011/main" val="1"/>
             </a:ext>
           </a:extLst>
         </p:spPr>
@@ -2650,7 +2650,7 @@
           </a:ln>
           <a:extLst>
             <a:ext uri="{FAA26D3D-D897-4be2-8F04-BA451C77F1D7}">
-              <ma14:placeholderFlag xmlns:ma14="http://schemas.microsoft.com/office/mac/drawingml/2011/main" xmlns="" val="1"/>
+              <ma14:placeholderFlag xmlns="" xmlns:ma14="http://schemas.microsoft.com/office/mac/drawingml/2011/main" val="1"/>
             </a:ext>
           </a:extLst>
         </p:spPr>
@@ -2822,14 +2822,14 @@
           <a:noFill/>
           <a:extLst>
             <a:ext uri="{909E8E84-426E-40dd-AFC4-6F175D3DCCD1}">
-              <a14:hiddenFill xmlns:a14="http://schemas.microsoft.com/office/drawing/2010/main" xmlns="">
+              <a14:hiddenFill xmlns="" xmlns:a14="http://schemas.microsoft.com/office/drawing/2010/main">
                 <a:solidFill>
                   <a:srgbClr val="FFFFFF"/>
                 </a:solidFill>
               </a14:hiddenFill>
             </a:ext>
             <a:ext uri="{91240B29-F687-4f45-9708-019B960494DF}">
-              <a14:hiddenLine xmlns:a14="http://schemas.microsoft.com/office/drawing/2010/main" xmlns="" w="9525">
+              <a14:hiddenLine xmlns="" xmlns:a14="http://schemas.microsoft.com/office/drawing/2010/main" w="9525">
                 <a:solidFill>
                   <a:srgbClr val="000000"/>
                 </a:solidFill>
@@ -2989,7 +2989,7 @@
           </a:ln>
           <a:extLst>
             <a:ext uri="{FAA26D3D-D897-4be2-8F04-BA451C77F1D7}">
-              <ma14:placeholderFlag xmlns:ma14="http://schemas.microsoft.com/office/mac/drawingml/2011/main" xmlns="" val="1"/>
+              <ma14:placeholderFlag xmlns="" xmlns:ma14="http://schemas.microsoft.com/office/mac/drawingml/2011/main" val="1"/>
             </a:ext>
           </a:extLst>
         </p:spPr>
@@ -3018,7 +3018,7 @@
           </a:ln>
           <a:extLst>
             <a:ext uri="{FAA26D3D-D897-4be2-8F04-BA451C77F1D7}">
-              <ma14:placeholderFlag xmlns:ma14="http://schemas.microsoft.com/office/mac/drawingml/2011/main" xmlns="" val="1"/>
+              <ma14:placeholderFlag xmlns="" xmlns:ma14="http://schemas.microsoft.com/office/mac/drawingml/2011/main" val="1"/>
             </a:ext>
           </a:extLst>
         </p:spPr>
@@ -3083,14 +3083,14 @@
           <a:noFill/>
           <a:extLst>
             <a:ext uri="{909E8E84-426E-40dd-AFC4-6F175D3DCCD1}">
-              <a14:hiddenFill xmlns:a14="http://schemas.microsoft.com/office/drawing/2010/main" xmlns="">
+              <a14:hiddenFill xmlns="" xmlns:a14="http://schemas.microsoft.com/office/drawing/2010/main">
                 <a:solidFill>
                   <a:srgbClr val="FFFFFF"/>
                 </a:solidFill>
               </a14:hiddenFill>
             </a:ext>
             <a:ext uri="{91240B29-F687-4f45-9708-019B960494DF}">
-              <a14:hiddenLine xmlns:a14="http://schemas.microsoft.com/office/drawing/2010/main" xmlns="" w="9525">
+              <a14:hiddenLine xmlns="" xmlns:a14="http://schemas.microsoft.com/office/drawing/2010/main" w="9525">
                 <a:solidFill>
                   <a:srgbClr val="000000"/>
                 </a:solidFill>
@@ -3250,7 +3250,7 @@
           </a:ln>
           <a:extLst>
             <a:ext uri="{FAA26D3D-D897-4be2-8F04-BA451C77F1D7}">
-              <ma14:placeholderFlag xmlns:ma14="http://schemas.microsoft.com/office/mac/drawingml/2011/main" xmlns="" val="1"/>
+              <ma14:placeholderFlag xmlns="" xmlns:ma14="http://schemas.microsoft.com/office/mac/drawingml/2011/main" val="1"/>
             </a:ext>
           </a:extLst>
         </p:spPr>
@@ -3279,7 +3279,7 @@
           </a:ln>
           <a:extLst>
             <a:ext uri="{FAA26D3D-D897-4be2-8F04-BA451C77F1D7}">
-              <ma14:placeholderFlag xmlns:ma14="http://schemas.microsoft.com/office/mac/drawingml/2011/main" xmlns="" val="1"/>
+              <ma14:placeholderFlag xmlns="" xmlns:ma14="http://schemas.microsoft.com/office/mac/drawingml/2011/main" val="1"/>
             </a:ext>
           </a:extLst>
         </p:spPr>
@@ -3344,14 +3344,14 @@
           <a:noFill/>
           <a:extLst>
             <a:ext uri="{909E8E84-426E-40dd-AFC4-6F175D3DCCD1}">
-              <a14:hiddenFill xmlns:a14="http://schemas.microsoft.com/office/drawing/2010/main" xmlns="">
+              <a14:hiddenFill xmlns="" xmlns:a14="http://schemas.microsoft.com/office/drawing/2010/main">
                 <a:solidFill>
                   <a:srgbClr val="FFFFFF"/>
                 </a:solidFill>
               </a14:hiddenFill>
             </a:ext>
             <a:ext uri="{91240B29-F687-4f45-9708-019B960494DF}">
-              <a14:hiddenLine xmlns:a14="http://schemas.microsoft.com/office/drawing/2010/main" xmlns="" w="9525">
+              <a14:hiddenLine xmlns="" xmlns:a14="http://schemas.microsoft.com/office/drawing/2010/main" w="9525">
                 <a:solidFill>
                   <a:srgbClr val="000000"/>
                 </a:solidFill>
@@ -3511,7 +3511,7 @@
           </a:ln>
           <a:extLst>
             <a:ext uri="{FAA26D3D-D897-4be2-8F04-BA451C77F1D7}">
-              <ma14:placeholderFlag xmlns:ma14="http://schemas.microsoft.com/office/mac/drawingml/2011/main" xmlns="" val="1"/>
+              <ma14:placeholderFlag xmlns="" xmlns:ma14="http://schemas.microsoft.com/office/mac/drawingml/2011/main" val="1"/>
             </a:ext>
           </a:extLst>
         </p:spPr>
@@ -3540,7 +3540,7 @@
           </a:ln>
           <a:extLst>
             <a:ext uri="{FAA26D3D-D897-4be2-8F04-BA451C77F1D7}">
-              <ma14:placeholderFlag xmlns:ma14="http://schemas.microsoft.com/office/mac/drawingml/2011/main" xmlns="" val="1"/>
+              <ma14:placeholderFlag xmlns="" xmlns:ma14="http://schemas.microsoft.com/office/mac/drawingml/2011/main" val="1"/>
             </a:ext>
           </a:extLst>
         </p:spPr>
@@ -4685,14 +4685,14 @@
           </a:ln>
           <a:extLst>
             <a:ext uri="{909E8E84-426E-40dd-AFC4-6F175D3DCCD1}">
-              <a14:hiddenFill xmlns:a14="http://schemas.microsoft.com/office/drawing/2010/main" xmlns="">
+              <a14:hiddenFill xmlns="" xmlns:a14="http://schemas.microsoft.com/office/drawing/2010/main">
                 <a:solidFill>
                   <a:srgbClr val="FFFFFF"/>
                 </a:solidFill>
               </a14:hiddenFill>
             </a:ext>
             <a:ext uri="{91240B29-F687-4f45-9708-019B960494DF}">
-              <a14:hiddenLine xmlns:a14="http://schemas.microsoft.com/office/drawing/2010/main" xmlns="" w="9525">
+              <a14:hiddenLine xmlns="" xmlns:a14="http://schemas.microsoft.com/office/drawing/2010/main" w="9525">
                 <a:solidFill>
                   <a:srgbClr val="000000"/>
                 </a:solidFill>
@@ -6987,14 +6987,14 @@
           </a:ln>
           <a:extLst>
             <a:ext uri="{909E8E84-426E-40dd-AFC4-6F175D3DCCD1}">
-              <a14:hiddenFill xmlns:a14="http://schemas.microsoft.com/office/drawing/2010/main" xmlns="">
+              <a14:hiddenFill xmlns="" xmlns:a14="http://schemas.microsoft.com/office/drawing/2010/main">
                 <a:solidFill>
                   <a:srgbClr val="FFFFFF"/>
                 </a:solidFill>
               </a14:hiddenFill>
             </a:ext>
             <a:ext uri="{91240B29-F687-4f45-9708-019B960494DF}">
-              <a14:hiddenLine xmlns:a14="http://schemas.microsoft.com/office/drawing/2010/main" xmlns="" w="9525">
+              <a14:hiddenLine xmlns="" xmlns:a14="http://schemas.microsoft.com/office/drawing/2010/main" w="9525">
                 <a:solidFill>
                   <a:srgbClr val="000000"/>
                 </a:solidFill>
@@ -8428,14 +8428,14 @@
           </a:ln>
           <a:extLst>
             <a:ext uri="{909E8E84-426E-40dd-AFC4-6F175D3DCCD1}">
-              <a14:hiddenFill xmlns:a14="http://schemas.microsoft.com/office/drawing/2010/main" xmlns="">
+              <a14:hiddenFill xmlns="" xmlns:a14="http://schemas.microsoft.com/office/drawing/2010/main">
                 <a:solidFill>
                   <a:srgbClr val="FFFFFF"/>
                 </a:solidFill>
               </a14:hiddenFill>
             </a:ext>
             <a:ext uri="{91240B29-F687-4f45-9708-019B960494DF}">
-              <a14:hiddenLine xmlns:a14="http://schemas.microsoft.com/office/drawing/2010/main" xmlns="" w="9525">
+              <a14:hiddenLine xmlns="" xmlns:a14="http://schemas.microsoft.com/office/drawing/2010/main" w="9525">
                 <a:solidFill>
                   <a:srgbClr val="000000"/>
                 </a:solidFill>
@@ -8482,14 +8482,14 @@
           </a:ln>
           <a:extLst>
             <a:ext uri="{909E8E84-426E-40dd-AFC4-6F175D3DCCD1}">
-              <a14:hiddenFill xmlns:a14="http://schemas.microsoft.com/office/drawing/2010/main" xmlns="">
+              <a14:hiddenFill xmlns="" xmlns:a14="http://schemas.microsoft.com/office/drawing/2010/main">
                 <a:solidFill>
                   <a:srgbClr val="FFFFFF"/>
                 </a:solidFill>
               </a14:hiddenFill>
             </a:ext>
             <a:ext uri="{91240B29-F687-4f45-9708-019B960494DF}">
-              <a14:hiddenLine xmlns:a14="http://schemas.microsoft.com/office/drawing/2010/main" xmlns="" w="9525">
+              <a14:hiddenLine xmlns="" xmlns:a14="http://schemas.microsoft.com/office/drawing/2010/main" w="9525">
                 <a:solidFill>
                   <a:srgbClr val="000000"/>
                 </a:solidFill>
@@ -8523,14 +8523,14 @@
           </a:ln>
           <a:extLst>
             <a:ext uri="{909E8E84-426E-40dd-AFC4-6F175D3DCCD1}">
-              <a14:hiddenFill xmlns:a14="http://schemas.microsoft.com/office/drawing/2010/main" xmlns="">
+              <a14:hiddenFill xmlns="" xmlns:a14="http://schemas.microsoft.com/office/drawing/2010/main">
                 <a:solidFill>
                   <a:srgbClr val="FFFFFF"/>
                 </a:solidFill>
               </a14:hiddenFill>
             </a:ext>
             <a:ext uri="{91240B29-F687-4f45-9708-019B960494DF}">
-              <a14:hiddenLine xmlns:a14="http://schemas.microsoft.com/office/drawing/2010/main" xmlns="" w="9525">
+              <a14:hiddenLine xmlns="" xmlns:a14="http://schemas.microsoft.com/office/drawing/2010/main" w="9525">
                 <a:solidFill>
                   <a:srgbClr val="000000"/>
                 </a:solidFill>
@@ -8684,14 +8684,14 @@
           </a:ln>
           <a:extLst>
             <a:ext uri="{909E8E84-426E-40dd-AFC4-6F175D3DCCD1}">
-              <a14:hiddenFill xmlns:a14="http://schemas.microsoft.com/office/drawing/2010/main" xmlns="">
+              <a14:hiddenFill xmlns="" xmlns:a14="http://schemas.microsoft.com/office/drawing/2010/main">
                 <a:solidFill>
                   <a:srgbClr val="FFFFFF"/>
                 </a:solidFill>
               </a14:hiddenFill>
             </a:ext>
             <a:ext uri="{91240B29-F687-4f45-9708-019B960494DF}">
-              <a14:hiddenLine xmlns:a14="http://schemas.microsoft.com/office/drawing/2010/main" xmlns="" w="9525">
+              <a14:hiddenLine xmlns="" xmlns:a14="http://schemas.microsoft.com/office/drawing/2010/main" w="9525">
                 <a:solidFill>
                   <a:srgbClr val="000000"/>
                 </a:solidFill>
@@ -8962,27 +8962,15 @@
                 <a:ea typeface="ＭＳ Ｐゴシック" charset="0"/>
                 <a:hlinkClick r:id="rId2"/>
               </a:rPr>
-              <a:t>https://goo.gl</a:t>
-            </a:r>
-            <a:r>
-              <a:rPr lang="en-US" sz="1500">
-                <a:latin typeface="Calibri" charset="0"/>
-                <a:ea typeface="ＭＳ Ｐゴシック" charset="0"/>
-                <a:hlinkClick r:id="rId2"/>
-              </a:rPr>
-              <a:t>/6LePBW</a:t>
-            </a:r>
-            <a:r>
-              <a:rPr lang="en-US" sz="1500">
+              <a:t>https://goo.gl/6LePBW</a:t>
+            </a:r>
+            <a:r>
+              <a:rPr lang="en-US" sz="1500" dirty="0">
                 <a:latin typeface="Calibri" charset="0"/>
                 <a:ea typeface="ＭＳ Ｐゴシック" charset="0"/>
               </a:rPr>
               <a:t> </a:t>
             </a:r>
-            <a:endParaRPr lang="en-US" sz="1500" dirty="0">
-              <a:latin typeface="Calibri" charset="0"/>
-              <a:ea typeface="ＭＳ Ｐゴシック" charset="0"/>
-            </a:endParaRPr>
           </a:p>
           <a:p>
             <a:pPr>
@@ -9790,14 +9778,14 @@
           </a:ln>
           <a:extLst>
             <a:ext uri="{909E8E84-426E-40dd-AFC4-6F175D3DCCD1}">
-              <a14:hiddenFill xmlns:a14="http://schemas.microsoft.com/office/drawing/2010/main" xmlns="">
+              <a14:hiddenFill xmlns="" xmlns:a14="http://schemas.microsoft.com/office/drawing/2010/main">
                 <a:solidFill>
                   <a:srgbClr val="FFFFFF"/>
                 </a:solidFill>
               </a14:hiddenFill>
             </a:ext>
             <a:ext uri="{91240B29-F687-4f45-9708-019B960494DF}">
-              <a14:hiddenLine xmlns:a14="http://schemas.microsoft.com/office/drawing/2010/main" xmlns="" w="9525">
+              <a14:hiddenLine xmlns="" xmlns:a14="http://schemas.microsoft.com/office/drawing/2010/main" w="9525">
                 <a:solidFill>
                   <a:srgbClr val="000000"/>
                 </a:solidFill>
@@ -11010,7 +10998,7 @@
                 <a:latin typeface="Calibri" charset="0"/>
                 <a:ea typeface="ＭＳ Ｐゴシック" charset="0"/>
               </a:rPr>
-              <a:t>Good news:  1-2 lanes of recent Illumina </a:t>
+              <a:t>Good news:  0.5 lanes of recent Illumina </a:t>
             </a:r>
             <a:r>
               <a:rPr lang="en-US" sz="2600" dirty="0" err="1">
@@ -11167,7 +11155,7 @@
                 <a:latin typeface="Calibri" charset="0"/>
                 <a:ea typeface="ＭＳ Ｐゴシック" charset="0"/>
               </a:rPr>
-              <a:t>Use aligner like BWA and a genome + junction database</a:t>
+              <a:t>Use aligner like Bowtie or BWA and a genome + junction database</a:t>
             </a:r>
           </a:p>
           <a:p>
@@ -11177,7 +11165,7 @@
                 <a:latin typeface="Calibri" charset="0"/>
                 <a:ea typeface="ＭＳ Ｐゴシック" charset="0"/>
               </a:rPr>
-              <a:t>Junction database needs to be tailored to read length</a:t>
+              <a:t>Junction database may need to be tailored to read length</a:t>
             </a:r>
           </a:p>
           <a:p>
@@ -11187,7 +11175,7 @@
                 <a:latin typeface="Calibri" charset="0"/>
                 <a:ea typeface="ＭＳ Ｐゴシック" charset="0"/>
               </a:rPr>
-              <a:t>Or you can use a standard junction database for all read lengths and an aligner that allows substring alignments for the junctions only (e.g. BLAST … slow).</a:t>
+              <a:t>Or you can use a standard junction database for all read lengths and an aligner that allows substring alignments for the junctions</a:t>
             </a:r>
           </a:p>
           <a:p>
@@ -11197,68 +11185,40 @@
                 <a:latin typeface="Calibri" charset="0"/>
                 <a:ea typeface="ＭＳ Ｐゴシック" charset="0"/>
               </a:rPr>
-              <a:t>Assembly strategy may also work (e.g. Trans-</a:t>
+              <a:t>Assembly strategy may also work (e.g. Trinity)</a:t>
+            </a:r>
+          </a:p>
+          <a:p>
+            <a:r>
+              <a:rPr lang="en-US" dirty="0">
+                <a:latin typeface="Calibri" charset="0"/>
+                <a:ea typeface="ＭＳ Ｐゴシック" charset="0"/>
+              </a:rPr>
+              <a:t>&gt; 50 </a:t>
             </a:r>
             <a:r>
               <a:rPr lang="en-US" dirty="0" err="1">
                 <a:latin typeface="Calibri" charset="0"/>
                 <a:ea typeface="ＭＳ Ｐゴシック" charset="0"/>
               </a:rPr>
-              <a:t>ABySS</a:t>
+              <a:t>bp</a:t>
             </a:r>
             <a:r>
               <a:rPr lang="en-US" dirty="0">
                 <a:latin typeface="Calibri" charset="0"/>
                 <a:ea typeface="ＭＳ Ｐゴシック" charset="0"/>
               </a:rPr>
-              <a:t>)</a:t>
-            </a:r>
-          </a:p>
-          <a:p>
+              <a:t> reads</a:t>
+            </a:r>
+          </a:p>
+          <a:p>
+            <a:pPr lvl="1"/>
             <a:r>
               <a:rPr lang="en-US" dirty="0">
                 <a:latin typeface="Calibri" charset="0"/>
                 <a:ea typeface="ＭＳ Ｐゴシック" charset="0"/>
               </a:rPr>
-              <a:t>&gt; 50 </a:t>
-            </a:r>
-            <a:r>
-              <a:rPr lang="en-US" dirty="0" err="1">
-                <a:latin typeface="Calibri" charset="0"/>
-                <a:ea typeface="ＭＳ Ｐゴシック" charset="0"/>
-              </a:rPr>
-              <a:t>bp</a:t>
-            </a:r>
-            <a:r>
-              <a:rPr lang="en-US" dirty="0">
-                <a:latin typeface="Calibri" charset="0"/>
-                <a:ea typeface="ＭＳ Ｐゴシック" charset="0"/>
-              </a:rPr>
-              <a:t> reads</a:t>
-            </a:r>
-          </a:p>
-          <a:p>
-            <a:pPr lvl="1"/>
-            <a:r>
-              <a:rPr lang="en-US" dirty="0">
-                <a:latin typeface="Calibri" charset="0"/>
-                <a:ea typeface="ＭＳ Ｐゴシック" charset="0"/>
-              </a:rPr>
-              <a:t>Spliced aligner such as Bowtie/</a:t>
-            </a:r>
-            <a:r>
-              <a:rPr lang="en-US" dirty="0" err="1">
-                <a:latin typeface="Calibri" charset="0"/>
-                <a:ea typeface="ＭＳ Ｐゴシック" charset="0"/>
-              </a:rPr>
-              <a:t>TopHat</a:t>
-            </a:r>
-            <a:r>
-              <a:rPr lang="en-US" dirty="0">
-                <a:latin typeface="Calibri" charset="0"/>
-                <a:ea typeface="ＭＳ Ｐゴシック" charset="0"/>
-              </a:rPr>
-              <a:t>, STAR, HISAT, etc.</a:t>
+              <a:t>Spliced aligner such as STAR, HISAT, etc.</a:t>
             </a:r>
           </a:p>
         </p:txBody>
@@ -11339,7 +11299,7 @@
         <p:spPr/>
         <p:txBody>
           <a:bodyPr>
-            <a:normAutofit fontScale="92500" lnSpcReduction="20000"/>
+            <a:normAutofit/>
           </a:bodyPr>
           <a:lstStyle/>
           <a:p>
@@ -11372,7 +11332,17 @@
             </a:pPr>
             <a:r>
               <a:rPr lang="en-US" dirty="0"/>
-              <a:t>Unfortunately de novo transcriptome assembly is currently beyond the scope of this workshop</a:t>
+              <a:t>E.g. Refer to the Trinity modules of </a:t>
+            </a:r>
+            <a:r>
+              <a:rPr lang="en-US" dirty="0">
+                <a:hlinkClick r:id="rId2"/>
+              </a:rPr>
+              <a:t>rnabio.org</a:t>
+            </a:r>
+            <a:r>
+              <a:rPr lang="en-US" dirty="0"/>
+              <a:t> online.</a:t>
             </a:r>
           </a:p>
           <a:p>
@@ -11381,7 +11351,17 @@
             </a:pPr>
             <a:r>
               <a:rPr lang="en-US" dirty="0"/>
-              <a:t>The good news is that the skills you learn here will help you figure out how to install and run those tools yourself</a:t>
+              <a:t>Also we provide example tools in </a:t>
+            </a:r>
+            <a:r>
+              <a:rPr lang="en-US" dirty="0">
+                <a:hlinkClick r:id="rId3"/>
+              </a:rPr>
+              <a:t>Supplementary Table 2</a:t>
+            </a:r>
+            <a:r>
+              <a:rPr lang="en-US" dirty="0"/>
+              <a:t>.</a:t>
             </a:r>
           </a:p>
           <a:p>
@@ -11389,27 +11369,8 @@
               <a:defRPr/>
             </a:pPr>
             <a:r>
-              <a:rPr lang="en-US" dirty="0"/>
-              <a:t>Also we provide example tools in </a:t>
-            </a:r>
-            <a:r>
               <a:rPr lang="en-US" dirty="0">
-                <a:hlinkClick r:id="rId2"/>
-              </a:rPr>
-              <a:t>Supplementary Table 2</a:t>
-            </a:r>
-            <a:r>
-              <a:rPr lang="en-US" dirty="0"/>
-              <a:t>.</a:t>
-            </a:r>
-          </a:p>
-          <a:p>
-            <a:pPr lvl="1">
-              <a:defRPr/>
-            </a:pPr>
-            <a:r>
-              <a:rPr lang="en-US" dirty="0">
-                <a:hlinkClick r:id="rId3"/>
+                <a:hlinkClick r:id="rId4"/>
               </a:rPr>
               <a:t>https://github.com/griffithlab/rnaseq_tutorial/wiki/Kallisto</a:t>
             </a:r>
@@ -11683,14 +11644,14 @@
           </a:ln>
           <a:extLst>
             <a:ext uri="{909E8E84-426E-40dd-AFC4-6F175D3DCCD1}">
-              <a14:hiddenFill xmlns:a14="http://schemas.microsoft.com/office/drawing/2010/main" xmlns="">
+              <a14:hiddenFill xmlns="" xmlns:a14="http://schemas.microsoft.com/office/drawing/2010/main">
                 <a:solidFill>
                   <a:srgbClr val="FFFFFF"/>
                 </a:solidFill>
               </a14:hiddenFill>
             </a:ext>
             <a:ext uri="{91240B29-F687-4f45-9708-019B960494DF}">
-              <a14:hiddenLine xmlns:a14="http://schemas.microsoft.com/office/drawing/2010/main" xmlns="" w="9525">
+              <a14:hiddenLine xmlns="" xmlns:a14="http://schemas.microsoft.com/office/drawing/2010/main" w="9525">
                 <a:solidFill>
                   <a:srgbClr val="000000"/>
                 </a:solidFill>
@@ -11852,14 +11813,14 @@
           </a:ln>
           <a:extLst>
             <a:ext uri="{909E8E84-426E-40dd-AFC4-6F175D3DCCD1}">
-              <a14:hiddenFill xmlns:a14="http://schemas.microsoft.com/office/drawing/2010/main" xmlns="">
+              <a14:hiddenFill xmlns="" xmlns:a14="http://schemas.microsoft.com/office/drawing/2010/main">
                 <a:solidFill>
                   <a:srgbClr val="FFFFFF"/>
                 </a:solidFill>
               </a14:hiddenFill>
             </a:ext>
             <a:ext uri="{91240B29-F687-4f45-9708-019B960494DF}">
-              <a14:hiddenLine xmlns:a14="http://schemas.microsoft.com/office/drawing/2010/main" xmlns="" w="9525">
+              <a14:hiddenLine xmlns="" xmlns:a14="http://schemas.microsoft.com/office/drawing/2010/main" w="9525">
                 <a:solidFill>
                   <a:srgbClr val="000000"/>
                 </a:solidFill>
@@ -12555,14 +12516,14 @@
           </a:ln>
           <a:extLst>
             <a:ext uri="{909E8E84-426E-40dd-AFC4-6F175D3DCCD1}">
-              <a14:hiddenFill xmlns:a14="http://schemas.microsoft.com/office/drawing/2010/main" xmlns="">
+              <a14:hiddenFill xmlns="" xmlns:a14="http://schemas.microsoft.com/office/drawing/2010/main">
                 <a:solidFill>
                   <a:srgbClr val="FFFFFF"/>
                 </a:solidFill>
               </a14:hiddenFill>
             </a:ext>
             <a:ext uri="{91240B29-F687-4f45-9708-019B960494DF}">
-              <a14:hiddenLine xmlns:a14="http://schemas.microsoft.com/office/drawing/2010/main" xmlns="" w="9525">
+              <a14:hiddenLine xmlns="" xmlns:a14="http://schemas.microsoft.com/office/drawing/2010/main" w="9525">
                 <a:solidFill>
                   <a:srgbClr val="000000"/>
                 </a:solidFill>

</xml_diff>

<commit_message>
fix tools path and update biostars exercise
</commit_message>
<xml_diff>
--- a/assets/lectures/cbw-cshl/2019/full/RNASeq_Module7_Lecture.pptx
+++ b/assets/lectures/cbw-cshl/2019/full/RNASeq_Module7_Lecture.pptx
@@ -540,14 +540,14 @@
           </a:ln>
           <a:extLst>
             <a:ext uri="{909E8E84-426E-40dd-AFC4-6F175D3DCCD1}">
-              <a14:hiddenFill xmlns="" xmlns:a14="http://schemas.microsoft.com/office/drawing/2010/main">
+              <a14:hiddenFill xmlns:a14="http://schemas.microsoft.com/office/drawing/2010/main" xmlns="">
                 <a:solidFill>
                   <a:srgbClr val="FFFFFF"/>
                 </a:solidFill>
               </a14:hiddenFill>
             </a:ext>
             <a:ext uri="{FAA26D3D-D897-4be2-8F04-BA451C77F1D7}">
-              <ma14:placeholderFlag xmlns="" xmlns:ma14="http://schemas.microsoft.com/office/mac/drawingml/2011/main" val="1"/>
+              <ma14:placeholderFlag xmlns:ma14="http://schemas.microsoft.com/office/mac/drawingml/2011/main" xmlns="" val="1"/>
             </a:ext>
           </a:extLst>
         </p:spPr>
@@ -566,14 +566,14 @@
           <a:noFill/>
           <a:extLst>
             <a:ext uri="{909E8E84-426E-40dd-AFC4-6F175D3DCCD1}">
-              <a14:hiddenFill xmlns="" xmlns:a14="http://schemas.microsoft.com/office/drawing/2010/main">
+              <a14:hiddenFill xmlns:a14="http://schemas.microsoft.com/office/drawing/2010/main" xmlns="">
                 <a:solidFill>
                   <a:srgbClr val="FFFFFF"/>
                 </a:solidFill>
               </a14:hiddenFill>
             </a:ext>
             <a:ext uri="{91240B29-F687-4f45-9708-019B960494DF}">
-              <a14:hiddenLine xmlns="" xmlns:a14="http://schemas.microsoft.com/office/drawing/2010/main" w="9525">
+              <a14:hiddenLine xmlns:a14="http://schemas.microsoft.com/office/drawing/2010/main" xmlns="" w="9525">
                 <a:solidFill>
                   <a:srgbClr val="000000"/>
                 </a:solidFill>
@@ -583,7 +583,7 @@
               </a14:hiddenLine>
             </a:ext>
             <a:ext uri="{FAA26D3D-D897-4be2-8F04-BA451C77F1D7}">
-              <ma14:placeholderFlag xmlns="" xmlns:ma14="http://schemas.microsoft.com/office/mac/drawingml/2011/main" val="1"/>
+              <ma14:placeholderFlag xmlns:ma14="http://schemas.microsoft.com/office/mac/drawingml/2011/main" xmlns="" val="1"/>
             </a:ext>
           </a:extLst>
         </p:spPr>
@@ -617,14 +617,14 @@
           <a:noFill/>
           <a:extLst>
             <a:ext uri="{909E8E84-426E-40dd-AFC4-6F175D3DCCD1}">
-              <a14:hiddenFill xmlns="" xmlns:a14="http://schemas.microsoft.com/office/drawing/2010/main">
+              <a14:hiddenFill xmlns:a14="http://schemas.microsoft.com/office/drawing/2010/main" xmlns="">
                 <a:solidFill>
                   <a:srgbClr val="FFFFFF"/>
                 </a:solidFill>
               </a14:hiddenFill>
             </a:ext>
             <a:ext uri="{91240B29-F687-4f45-9708-019B960494DF}">
-              <a14:hiddenLine xmlns="" xmlns:a14="http://schemas.microsoft.com/office/drawing/2010/main" w="9525">
+              <a14:hiddenLine xmlns:a14="http://schemas.microsoft.com/office/drawing/2010/main" xmlns="" w="9525">
                 <a:solidFill>
                   <a:srgbClr val="000000"/>
                 </a:solidFill>
@@ -804,14 +804,14 @@
           <a:noFill/>
           <a:extLst>
             <a:ext uri="{909E8E84-426E-40dd-AFC4-6F175D3DCCD1}">
-              <a14:hiddenFill xmlns="" xmlns:a14="http://schemas.microsoft.com/office/drawing/2010/main">
+              <a14:hiddenFill xmlns:a14="http://schemas.microsoft.com/office/drawing/2010/main" xmlns="">
                 <a:solidFill>
                   <a:srgbClr val="FFFFFF"/>
                 </a:solidFill>
               </a14:hiddenFill>
             </a:ext>
             <a:ext uri="{91240B29-F687-4f45-9708-019B960494DF}">
-              <a14:hiddenLine xmlns="" xmlns:a14="http://schemas.microsoft.com/office/drawing/2010/main" w="9525">
+              <a14:hiddenLine xmlns:a14="http://schemas.microsoft.com/office/drawing/2010/main" xmlns="" w="9525">
                 <a:solidFill>
                   <a:srgbClr val="000000"/>
                 </a:solidFill>
@@ -971,7 +971,7 @@
           </a:ln>
           <a:extLst>
             <a:ext uri="{FAA26D3D-D897-4be2-8F04-BA451C77F1D7}">
-              <ma14:placeholderFlag xmlns="" xmlns:ma14="http://schemas.microsoft.com/office/mac/drawingml/2011/main" val="1"/>
+              <ma14:placeholderFlag xmlns:ma14="http://schemas.microsoft.com/office/mac/drawingml/2011/main" xmlns="" val="1"/>
             </a:ext>
           </a:extLst>
         </p:spPr>
@@ -1000,7 +1000,7 @@
           </a:ln>
           <a:extLst>
             <a:ext uri="{FAA26D3D-D897-4be2-8F04-BA451C77F1D7}">
-              <ma14:placeholderFlag xmlns="" xmlns:ma14="http://schemas.microsoft.com/office/mac/drawingml/2011/main" val="1"/>
+              <ma14:placeholderFlag xmlns:ma14="http://schemas.microsoft.com/office/mac/drawingml/2011/main" xmlns="" val="1"/>
             </a:ext>
           </a:extLst>
         </p:spPr>
@@ -1065,14 +1065,14 @@
           <a:noFill/>
           <a:extLst>
             <a:ext uri="{909E8E84-426E-40dd-AFC4-6F175D3DCCD1}">
-              <a14:hiddenFill xmlns="" xmlns:a14="http://schemas.microsoft.com/office/drawing/2010/main">
+              <a14:hiddenFill xmlns:a14="http://schemas.microsoft.com/office/drawing/2010/main" xmlns="">
                 <a:solidFill>
                   <a:srgbClr val="FFFFFF"/>
                 </a:solidFill>
               </a14:hiddenFill>
             </a:ext>
             <a:ext uri="{91240B29-F687-4f45-9708-019B960494DF}">
-              <a14:hiddenLine xmlns="" xmlns:a14="http://schemas.microsoft.com/office/drawing/2010/main" w="9525">
+              <a14:hiddenLine xmlns:a14="http://schemas.microsoft.com/office/drawing/2010/main" xmlns="" w="9525">
                 <a:solidFill>
                   <a:srgbClr val="000000"/>
                 </a:solidFill>
@@ -1232,7 +1232,7 @@
           </a:ln>
           <a:extLst>
             <a:ext uri="{FAA26D3D-D897-4be2-8F04-BA451C77F1D7}">
-              <ma14:placeholderFlag xmlns="" xmlns:ma14="http://schemas.microsoft.com/office/mac/drawingml/2011/main" val="1"/>
+              <ma14:placeholderFlag xmlns:ma14="http://schemas.microsoft.com/office/mac/drawingml/2011/main" xmlns="" val="1"/>
             </a:ext>
           </a:extLst>
         </p:spPr>
@@ -1261,7 +1261,7 @@
           </a:ln>
           <a:extLst>
             <a:ext uri="{FAA26D3D-D897-4be2-8F04-BA451C77F1D7}">
-              <ma14:placeholderFlag xmlns="" xmlns:ma14="http://schemas.microsoft.com/office/mac/drawingml/2011/main" val="1"/>
+              <ma14:placeholderFlag xmlns:ma14="http://schemas.microsoft.com/office/mac/drawingml/2011/main" xmlns="" val="1"/>
             </a:ext>
           </a:extLst>
         </p:spPr>
@@ -1326,14 +1326,14 @@
           <a:noFill/>
           <a:extLst>
             <a:ext uri="{909E8E84-426E-40dd-AFC4-6F175D3DCCD1}">
-              <a14:hiddenFill xmlns="" xmlns:a14="http://schemas.microsoft.com/office/drawing/2010/main">
+              <a14:hiddenFill xmlns:a14="http://schemas.microsoft.com/office/drawing/2010/main" xmlns="">
                 <a:solidFill>
                   <a:srgbClr val="FFFFFF"/>
                 </a:solidFill>
               </a14:hiddenFill>
             </a:ext>
             <a:ext uri="{91240B29-F687-4f45-9708-019B960494DF}">
-              <a14:hiddenLine xmlns="" xmlns:a14="http://schemas.microsoft.com/office/drawing/2010/main" w="9525">
+              <a14:hiddenLine xmlns:a14="http://schemas.microsoft.com/office/drawing/2010/main" xmlns="" w="9525">
                 <a:solidFill>
                   <a:srgbClr val="000000"/>
                 </a:solidFill>
@@ -1493,7 +1493,7 @@
           </a:ln>
           <a:extLst>
             <a:ext uri="{FAA26D3D-D897-4be2-8F04-BA451C77F1D7}">
-              <ma14:placeholderFlag xmlns="" xmlns:ma14="http://schemas.microsoft.com/office/mac/drawingml/2011/main" val="1"/>
+              <ma14:placeholderFlag xmlns:ma14="http://schemas.microsoft.com/office/mac/drawingml/2011/main" xmlns="" val="1"/>
             </a:ext>
           </a:extLst>
         </p:spPr>
@@ -1522,7 +1522,7 @@
           </a:ln>
           <a:extLst>
             <a:ext uri="{FAA26D3D-D897-4be2-8F04-BA451C77F1D7}">
-              <ma14:placeholderFlag xmlns="" xmlns:ma14="http://schemas.microsoft.com/office/mac/drawingml/2011/main" val="1"/>
+              <ma14:placeholderFlag xmlns:ma14="http://schemas.microsoft.com/office/mac/drawingml/2011/main" xmlns="" val="1"/>
             </a:ext>
           </a:extLst>
         </p:spPr>
@@ -1587,14 +1587,14 @@
           <a:noFill/>
           <a:extLst>
             <a:ext uri="{909E8E84-426E-40dd-AFC4-6F175D3DCCD1}">
-              <a14:hiddenFill xmlns="" xmlns:a14="http://schemas.microsoft.com/office/drawing/2010/main">
+              <a14:hiddenFill xmlns:a14="http://schemas.microsoft.com/office/drawing/2010/main" xmlns="">
                 <a:solidFill>
                   <a:srgbClr val="FFFFFF"/>
                 </a:solidFill>
               </a14:hiddenFill>
             </a:ext>
             <a:ext uri="{91240B29-F687-4f45-9708-019B960494DF}">
-              <a14:hiddenLine xmlns="" xmlns:a14="http://schemas.microsoft.com/office/drawing/2010/main" w="9525">
+              <a14:hiddenLine xmlns:a14="http://schemas.microsoft.com/office/drawing/2010/main" xmlns="" w="9525">
                 <a:solidFill>
                   <a:srgbClr val="000000"/>
                 </a:solidFill>
@@ -1754,7 +1754,7 @@
           </a:ln>
           <a:extLst>
             <a:ext uri="{FAA26D3D-D897-4be2-8F04-BA451C77F1D7}">
-              <ma14:placeholderFlag xmlns="" xmlns:ma14="http://schemas.microsoft.com/office/mac/drawingml/2011/main" val="1"/>
+              <ma14:placeholderFlag xmlns:ma14="http://schemas.microsoft.com/office/mac/drawingml/2011/main" xmlns="" val="1"/>
             </a:ext>
           </a:extLst>
         </p:spPr>
@@ -1783,7 +1783,7 @@
           </a:ln>
           <a:extLst>
             <a:ext uri="{FAA26D3D-D897-4be2-8F04-BA451C77F1D7}">
-              <ma14:placeholderFlag xmlns="" xmlns:ma14="http://schemas.microsoft.com/office/mac/drawingml/2011/main" val="1"/>
+              <ma14:placeholderFlag xmlns:ma14="http://schemas.microsoft.com/office/mac/drawingml/2011/main" xmlns="" val="1"/>
             </a:ext>
           </a:extLst>
         </p:spPr>
@@ -1848,14 +1848,14 @@
           <a:noFill/>
           <a:extLst>
             <a:ext uri="{909E8E84-426E-40dd-AFC4-6F175D3DCCD1}">
-              <a14:hiddenFill xmlns="" xmlns:a14="http://schemas.microsoft.com/office/drawing/2010/main">
+              <a14:hiddenFill xmlns:a14="http://schemas.microsoft.com/office/drawing/2010/main" xmlns="">
                 <a:solidFill>
                   <a:srgbClr val="FFFFFF"/>
                 </a:solidFill>
               </a14:hiddenFill>
             </a:ext>
             <a:ext uri="{91240B29-F687-4f45-9708-019B960494DF}">
-              <a14:hiddenLine xmlns="" xmlns:a14="http://schemas.microsoft.com/office/drawing/2010/main" w="9525">
+              <a14:hiddenLine xmlns:a14="http://schemas.microsoft.com/office/drawing/2010/main" xmlns="" w="9525">
                 <a:solidFill>
                   <a:srgbClr val="000000"/>
                 </a:solidFill>
@@ -2015,7 +2015,7 @@
           </a:ln>
           <a:extLst>
             <a:ext uri="{FAA26D3D-D897-4be2-8F04-BA451C77F1D7}">
-              <ma14:placeholderFlag xmlns="" xmlns:ma14="http://schemas.microsoft.com/office/mac/drawingml/2011/main" val="1"/>
+              <ma14:placeholderFlag xmlns:ma14="http://schemas.microsoft.com/office/mac/drawingml/2011/main" xmlns="" val="1"/>
             </a:ext>
           </a:extLst>
         </p:spPr>
@@ -2044,7 +2044,7 @@
           </a:ln>
           <a:extLst>
             <a:ext uri="{FAA26D3D-D897-4be2-8F04-BA451C77F1D7}">
-              <ma14:placeholderFlag xmlns="" xmlns:ma14="http://schemas.microsoft.com/office/mac/drawingml/2011/main" val="1"/>
+              <ma14:placeholderFlag xmlns:ma14="http://schemas.microsoft.com/office/mac/drawingml/2011/main" xmlns="" val="1"/>
             </a:ext>
           </a:extLst>
         </p:spPr>
@@ -2193,14 +2193,14 @@
           <a:noFill/>
           <a:extLst>
             <a:ext uri="{909E8E84-426E-40dd-AFC4-6F175D3DCCD1}">
-              <a14:hiddenFill xmlns="" xmlns:a14="http://schemas.microsoft.com/office/drawing/2010/main">
+              <a14:hiddenFill xmlns:a14="http://schemas.microsoft.com/office/drawing/2010/main" xmlns="">
                 <a:solidFill>
                   <a:srgbClr val="FFFFFF"/>
                 </a:solidFill>
               </a14:hiddenFill>
             </a:ext>
             <a:ext uri="{91240B29-F687-4f45-9708-019B960494DF}">
-              <a14:hiddenLine xmlns="" xmlns:a14="http://schemas.microsoft.com/office/drawing/2010/main" w="9525">
+              <a14:hiddenLine xmlns:a14="http://schemas.microsoft.com/office/drawing/2010/main" xmlns="" w="9525">
                 <a:solidFill>
                   <a:srgbClr val="000000"/>
                 </a:solidFill>
@@ -2360,7 +2360,7 @@
           </a:ln>
           <a:extLst>
             <a:ext uri="{FAA26D3D-D897-4be2-8F04-BA451C77F1D7}">
-              <ma14:placeholderFlag xmlns="" xmlns:ma14="http://schemas.microsoft.com/office/mac/drawingml/2011/main" val="1"/>
+              <ma14:placeholderFlag xmlns:ma14="http://schemas.microsoft.com/office/mac/drawingml/2011/main" xmlns="" val="1"/>
             </a:ext>
           </a:extLst>
         </p:spPr>
@@ -2389,7 +2389,7 @@
           </a:ln>
           <a:extLst>
             <a:ext uri="{FAA26D3D-D897-4be2-8F04-BA451C77F1D7}">
-              <ma14:placeholderFlag xmlns="" xmlns:ma14="http://schemas.microsoft.com/office/mac/drawingml/2011/main" val="1"/>
+              <ma14:placeholderFlag xmlns:ma14="http://schemas.microsoft.com/office/mac/drawingml/2011/main" xmlns="" val="1"/>
             </a:ext>
           </a:extLst>
         </p:spPr>
@@ -2454,14 +2454,14 @@
           <a:noFill/>
           <a:extLst>
             <a:ext uri="{909E8E84-426E-40dd-AFC4-6F175D3DCCD1}">
-              <a14:hiddenFill xmlns="" xmlns:a14="http://schemas.microsoft.com/office/drawing/2010/main">
+              <a14:hiddenFill xmlns:a14="http://schemas.microsoft.com/office/drawing/2010/main" xmlns="">
                 <a:solidFill>
                   <a:srgbClr val="FFFFFF"/>
                 </a:solidFill>
               </a14:hiddenFill>
             </a:ext>
             <a:ext uri="{91240B29-F687-4f45-9708-019B960494DF}">
-              <a14:hiddenLine xmlns="" xmlns:a14="http://schemas.microsoft.com/office/drawing/2010/main" w="9525">
+              <a14:hiddenLine xmlns:a14="http://schemas.microsoft.com/office/drawing/2010/main" xmlns="" w="9525">
                 <a:solidFill>
                   <a:srgbClr val="000000"/>
                 </a:solidFill>
@@ -2621,7 +2621,7 @@
           </a:ln>
           <a:extLst>
             <a:ext uri="{FAA26D3D-D897-4be2-8F04-BA451C77F1D7}">
-              <ma14:placeholderFlag xmlns="" xmlns:ma14="http://schemas.microsoft.com/office/mac/drawingml/2011/main" val="1"/>
+              <ma14:placeholderFlag xmlns:ma14="http://schemas.microsoft.com/office/mac/drawingml/2011/main" xmlns="" val="1"/>
             </a:ext>
           </a:extLst>
         </p:spPr>
@@ -2650,7 +2650,7 @@
           </a:ln>
           <a:extLst>
             <a:ext uri="{FAA26D3D-D897-4be2-8F04-BA451C77F1D7}">
-              <ma14:placeholderFlag xmlns="" xmlns:ma14="http://schemas.microsoft.com/office/mac/drawingml/2011/main" val="1"/>
+              <ma14:placeholderFlag xmlns:ma14="http://schemas.microsoft.com/office/mac/drawingml/2011/main" xmlns="" val="1"/>
             </a:ext>
           </a:extLst>
         </p:spPr>
@@ -2822,14 +2822,14 @@
           <a:noFill/>
           <a:extLst>
             <a:ext uri="{909E8E84-426E-40dd-AFC4-6F175D3DCCD1}">
-              <a14:hiddenFill xmlns="" xmlns:a14="http://schemas.microsoft.com/office/drawing/2010/main">
+              <a14:hiddenFill xmlns:a14="http://schemas.microsoft.com/office/drawing/2010/main" xmlns="">
                 <a:solidFill>
                   <a:srgbClr val="FFFFFF"/>
                 </a:solidFill>
               </a14:hiddenFill>
             </a:ext>
             <a:ext uri="{91240B29-F687-4f45-9708-019B960494DF}">
-              <a14:hiddenLine xmlns="" xmlns:a14="http://schemas.microsoft.com/office/drawing/2010/main" w="9525">
+              <a14:hiddenLine xmlns:a14="http://schemas.microsoft.com/office/drawing/2010/main" xmlns="" w="9525">
                 <a:solidFill>
                   <a:srgbClr val="000000"/>
                 </a:solidFill>
@@ -2989,7 +2989,7 @@
           </a:ln>
           <a:extLst>
             <a:ext uri="{FAA26D3D-D897-4be2-8F04-BA451C77F1D7}">
-              <ma14:placeholderFlag xmlns="" xmlns:ma14="http://schemas.microsoft.com/office/mac/drawingml/2011/main" val="1"/>
+              <ma14:placeholderFlag xmlns:ma14="http://schemas.microsoft.com/office/mac/drawingml/2011/main" xmlns="" val="1"/>
             </a:ext>
           </a:extLst>
         </p:spPr>
@@ -3018,7 +3018,7 @@
           </a:ln>
           <a:extLst>
             <a:ext uri="{FAA26D3D-D897-4be2-8F04-BA451C77F1D7}">
-              <ma14:placeholderFlag xmlns="" xmlns:ma14="http://schemas.microsoft.com/office/mac/drawingml/2011/main" val="1"/>
+              <ma14:placeholderFlag xmlns:ma14="http://schemas.microsoft.com/office/mac/drawingml/2011/main" xmlns="" val="1"/>
             </a:ext>
           </a:extLst>
         </p:spPr>
@@ -3083,14 +3083,14 @@
           <a:noFill/>
           <a:extLst>
             <a:ext uri="{909E8E84-426E-40dd-AFC4-6F175D3DCCD1}">
-              <a14:hiddenFill xmlns="" xmlns:a14="http://schemas.microsoft.com/office/drawing/2010/main">
+              <a14:hiddenFill xmlns:a14="http://schemas.microsoft.com/office/drawing/2010/main" xmlns="">
                 <a:solidFill>
                   <a:srgbClr val="FFFFFF"/>
                 </a:solidFill>
               </a14:hiddenFill>
             </a:ext>
             <a:ext uri="{91240B29-F687-4f45-9708-019B960494DF}">
-              <a14:hiddenLine xmlns="" xmlns:a14="http://schemas.microsoft.com/office/drawing/2010/main" w="9525">
+              <a14:hiddenLine xmlns:a14="http://schemas.microsoft.com/office/drawing/2010/main" xmlns="" w="9525">
                 <a:solidFill>
                   <a:srgbClr val="000000"/>
                 </a:solidFill>
@@ -3250,7 +3250,7 @@
           </a:ln>
           <a:extLst>
             <a:ext uri="{FAA26D3D-D897-4be2-8F04-BA451C77F1D7}">
-              <ma14:placeholderFlag xmlns="" xmlns:ma14="http://schemas.microsoft.com/office/mac/drawingml/2011/main" val="1"/>
+              <ma14:placeholderFlag xmlns:ma14="http://schemas.microsoft.com/office/mac/drawingml/2011/main" xmlns="" val="1"/>
             </a:ext>
           </a:extLst>
         </p:spPr>
@@ -3279,7 +3279,7 @@
           </a:ln>
           <a:extLst>
             <a:ext uri="{FAA26D3D-D897-4be2-8F04-BA451C77F1D7}">
-              <ma14:placeholderFlag xmlns="" xmlns:ma14="http://schemas.microsoft.com/office/mac/drawingml/2011/main" val="1"/>
+              <ma14:placeholderFlag xmlns:ma14="http://schemas.microsoft.com/office/mac/drawingml/2011/main" xmlns="" val="1"/>
             </a:ext>
           </a:extLst>
         </p:spPr>
@@ -3344,14 +3344,14 @@
           <a:noFill/>
           <a:extLst>
             <a:ext uri="{909E8E84-426E-40dd-AFC4-6F175D3DCCD1}">
-              <a14:hiddenFill xmlns="" xmlns:a14="http://schemas.microsoft.com/office/drawing/2010/main">
+              <a14:hiddenFill xmlns:a14="http://schemas.microsoft.com/office/drawing/2010/main" xmlns="">
                 <a:solidFill>
                   <a:srgbClr val="FFFFFF"/>
                 </a:solidFill>
               </a14:hiddenFill>
             </a:ext>
             <a:ext uri="{91240B29-F687-4f45-9708-019B960494DF}">
-              <a14:hiddenLine xmlns="" xmlns:a14="http://schemas.microsoft.com/office/drawing/2010/main" w="9525">
+              <a14:hiddenLine xmlns:a14="http://schemas.microsoft.com/office/drawing/2010/main" xmlns="" w="9525">
                 <a:solidFill>
                   <a:srgbClr val="000000"/>
                 </a:solidFill>
@@ -3511,7 +3511,7 @@
           </a:ln>
           <a:extLst>
             <a:ext uri="{FAA26D3D-D897-4be2-8F04-BA451C77F1D7}">
-              <ma14:placeholderFlag xmlns="" xmlns:ma14="http://schemas.microsoft.com/office/mac/drawingml/2011/main" val="1"/>
+              <ma14:placeholderFlag xmlns:ma14="http://schemas.microsoft.com/office/mac/drawingml/2011/main" xmlns="" val="1"/>
             </a:ext>
           </a:extLst>
         </p:spPr>
@@ -3540,7 +3540,7 @@
           </a:ln>
           <a:extLst>
             <a:ext uri="{FAA26D3D-D897-4be2-8F04-BA451C77F1D7}">
-              <ma14:placeholderFlag xmlns="" xmlns:ma14="http://schemas.microsoft.com/office/mac/drawingml/2011/main" val="1"/>
+              <ma14:placeholderFlag xmlns:ma14="http://schemas.microsoft.com/office/mac/drawingml/2011/main" xmlns="" val="1"/>
             </a:ext>
           </a:extLst>
         </p:spPr>
@@ -4685,14 +4685,14 @@
           </a:ln>
           <a:extLst>
             <a:ext uri="{909E8E84-426E-40dd-AFC4-6F175D3DCCD1}">
-              <a14:hiddenFill xmlns="" xmlns:a14="http://schemas.microsoft.com/office/drawing/2010/main">
+              <a14:hiddenFill xmlns:a14="http://schemas.microsoft.com/office/drawing/2010/main" xmlns="">
                 <a:solidFill>
                   <a:srgbClr val="FFFFFF"/>
                 </a:solidFill>
               </a14:hiddenFill>
             </a:ext>
             <a:ext uri="{91240B29-F687-4f45-9708-019B960494DF}">
-              <a14:hiddenLine xmlns="" xmlns:a14="http://schemas.microsoft.com/office/drawing/2010/main" w="9525">
+              <a14:hiddenLine xmlns:a14="http://schemas.microsoft.com/office/drawing/2010/main" xmlns="" w="9525">
                 <a:solidFill>
                   <a:srgbClr val="000000"/>
                 </a:solidFill>
@@ -6987,14 +6987,14 @@
           </a:ln>
           <a:extLst>
             <a:ext uri="{909E8E84-426E-40dd-AFC4-6F175D3DCCD1}">
-              <a14:hiddenFill xmlns="" xmlns:a14="http://schemas.microsoft.com/office/drawing/2010/main">
+              <a14:hiddenFill xmlns:a14="http://schemas.microsoft.com/office/drawing/2010/main" xmlns="">
                 <a:solidFill>
                   <a:srgbClr val="FFFFFF"/>
                 </a:solidFill>
               </a14:hiddenFill>
             </a:ext>
             <a:ext uri="{91240B29-F687-4f45-9708-019B960494DF}">
-              <a14:hiddenLine xmlns="" xmlns:a14="http://schemas.microsoft.com/office/drawing/2010/main" w="9525">
+              <a14:hiddenLine xmlns:a14="http://schemas.microsoft.com/office/drawing/2010/main" xmlns="" w="9525">
                 <a:solidFill>
                   <a:srgbClr val="000000"/>
                 </a:solidFill>
@@ -8428,14 +8428,14 @@
           </a:ln>
           <a:extLst>
             <a:ext uri="{909E8E84-426E-40dd-AFC4-6F175D3DCCD1}">
-              <a14:hiddenFill xmlns="" xmlns:a14="http://schemas.microsoft.com/office/drawing/2010/main">
+              <a14:hiddenFill xmlns:a14="http://schemas.microsoft.com/office/drawing/2010/main" xmlns="">
                 <a:solidFill>
                   <a:srgbClr val="FFFFFF"/>
                 </a:solidFill>
               </a14:hiddenFill>
             </a:ext>
             <a:ext uri="{91240B29-F687-4f45-9708-019B960494DF}">
-              <a14:hiddenLine xmlns="" xmlns:a14="http://schemas.microsoft.com/office/drawing/2010/main" w="9525">
+              <a14:hiddenLine xmlns:a14="http://schemas.microsoft.com/office/drawing/2010/main" xmlns="" w="9525">
                 <a:solidFill>
                   <a:srgbClr val="000000"/>
                 </a:solidFill>
@@ -8482,14 +8482,14 @@
           </a:ln>
           <a:extLst>
             <a:ext uri="{909E8E84-426E-40dd-AFC4-6F175D3DCCD1}">
-              <a14:hiddenFill xmlns="" xmlns:a14="http://schemas.microsoft.com/office/drawing/2010/main">
+              <a14:hiddenFill xmlns:a14="http://schemas.microsoft.com/office/drawing/2010/main" xmlns="">
                 <a:solidFill>
                   <a:srgbClr val="FFFFFF"/>
                 </a:solidFill>
               </a14:hiddenFill>
             </a:ext>
             <a:ext uri="{91240B29-F687-4f45-9708-019B960494DF}">
-              <a14:hiddenLine xmlns="" xmlns:a14="http://schemas.microsoft.com/office/drawing/2010/main" w="9525">
+              <a14:hiddenLine xmlns:a14="http://schemas.microsoft.com/office/drawing/2010/main" xmlns="" w="9525">
                 <a:solidFill>
                   <a:srgbClr val="000000"/>
                 </a:solidFill>
@@ -8523,14 +8523,14 @@
           </a:ln>
           <a:extLst>
             <a:ext uri="{909E8E84-426E-40dd-AFC4-6F175D3DCCD1}">
-              <a14:hiddenFill xmlns="" xmlns:a14="http://schemas.microsoft.com/office/drawing/2010/main">
+              <a14:hiddenFill xmlns:a14="http://schemas.microsoft.com/office/drawing/2010/main" xmlns="">
                 <a:solidFill>
                   <a:srgbClr val="FFFFFF"/>
                 </a:solidFill>
               </a14:hiddenFill>
             </a:ext>
             <a:ext uri="{91240B29-F687-4f45-9708-019B960494DF}">
-              <a14:hiddenLine xmlns="" xmlns:a14="http://schemas.microsoft.com/office/drawing/2010/main" w="9525">
+              <a14:hiddenLine xmlns:a14="http://schemas.microsoft.com/office/drawing/2010/main" xmlns="" w="9525">
                 <a:solidFill>
                   <a:srgbClr val="000000"/>
                 </a:solidFill>
@@ -8684,14 +8684,14 @@
           </a:ln>
           <a:extLst>
             <a:ext uri="{909E8E84-426E-40dd-AFC4-6F175D3DCCD1}">
-              <a14:hiddenFill xmlns="" xmlns:a14="http://schemas.microsoft.com/office/drawing/2010/main">
+              <a14:hiddenFill xmlns:a14="http://schemas.microsoft.com/office/drawing/2010/main" xmlns="">
                 <a:solidFill>
                   <a:srgbClr val="FFFFFF"/>
                 </a:solidFill>
               </a14:hiddenFill>
             </a:ext>
             <a:ext uri="{91240B29-F687-4f45-9708-019B960494DF}">
-              <a14:hiddenLine xmlns="" xmlns:a14="http://schemas.microsoft.com/office/drawing/2010/main" w="9525">
+              <a14:hiddenLine xmlns:a14="http://schemas.microsoft.com/office/drawing/2010/main" xmlns="" w="9525">
                 <a:solidFill>
                   <a:srgbClr val="000000"/>
                 </a:solidFill>
@@ -9778,14 +9778,14 @@
           </a:ln>
           <a:extLst>
             <a:ext uri="{909E8E84-426E-40dd-AFC4-6F175D3DCCD1}">
-              <a14:hiddenFill xmlns="" xmlns:a14="http://schemas.microsoft.com/office/drawing/2010/main">
+              <a14:hiddenFill xmlns:a14="http://schemas.microsoft.com/office/drawing/2010/main" xmlns="">
                 <a:solidFill>
                   <a:srgbClr val="FFFFFF"/>
                 </a:solidFill>
               </a14:hiddenFill>
             </a:ext>
             <a:ext uri="{91240B29-F687-4f45-9708-019B960494DF}">
-              <a14:hiddenLine xmlns="" xmlns:a14="http://schemas.microsoft.com/office/drawing/2010/main" w="9525">
+              <a14:hiddenLine xmlns:a14="http://schemas.microsoft.com/office/drawing/2010/main" xmlns="" w="9525">
                 <a:solidFill>
                   <a:srgbClr val="000000"/>
                 </a:solidFill>
@@ -10441,24 +10441,38 @@
           <a:lstStyle/>
           <a:p>
             <a:r>
-              <a:rPr lang="en-US">
-                <a:latin typeface="Calibri" charset="0"/>
-                <a:ea typeface="ＭＳ Ｐゴシック" charset="0"/>
-              </a:rPr>
-              <a:t>Go to the BioStar website:</a:t>
+              <a:rPr lang="en-US" dirty="0">
+                <a:latin typeface="Calibri" charset="0"/>
+                <a:ea typeface="ＭＳ Ｐゴシック" charset="0"/>
+              </a:rPr>
+              <a:t>Go to the </a:t>
+            </a:r>
+            <a:r>
+              <a:rPr lang="en-US" dirty="0" err="1">
+                <a:latin typeface="Calibri" charset="0"/>
+                <a:ea typeface="ＭＳ Ｐゴシック" charset="0"/>
+              </a:rPr>
+              <a:t>BioStar</a:t>
+            </a:r>
+            <a:r>
+              <a:rPr lang="en-US" dirty="0">
+                <a:latin typeface="Calibri" charset="0"/>
+                <a:ea typeface="ＭＳ Ｐゴシック" charset="0"/>
+              </a:rPr>
+              <a:t> website:</a:t>
             </a:r>
           </a:p>
           <a:p>
             <a:pPr lvl="1"/>
             <a:r>
-              <a:rPr lang="en-US">
+              <a:rPr lang="en-US" dirty="0">
                 <a:latin typeface="Calibri" charset="0"/>
                 <a:ea typeface="ＭＳ Ｐゴシック" charset="0"/>
                 <a:hlinkClick r:id="rId2"/>
               </a:rPr>
               <a:t>http://www.biostars.org/</a:t>
             </a:r>
-            <a:endParaRPr lang="en-US">
+            <a:endParaRPr lang="en-US" dirty="0">
               <a:latin typeface="Calibri" charset="0"/>
               <a:ea typeface="ＭＳ Ｐゴシック" charset="0"/>
             </a:endParaRPr>
@@ -10466,7 +10480,7 @@
           <a:p>
             <a:pPr lvl="1"/>
             <a:r>
-              <a:rPr lang="en-US">
+              <a:rPr lang="en-US" dirty="0">
                 <a:latin typeface="Calibri" charset="0"/>
                 <a:ea typeface="ＭＳ Ｐゴシック" charset="0"/>
               </a:rPr>
@@ -10476,7 +10490,7 @@
           <a:p>
             <a:pPr lvl="1"/>
             <a:r>
-              <a:rPr lang="en-US">
+              <a:rPr lang="en-US" dirty="0">
                 <a:latin typeface="Calibri" charset="0"/>
                 <a:ea typeface="ＭＳ Ｐゴシック" charset="0"/>
               </a:rPr>
@@ -10490,7 +10504,7 @@
               <a:t>‘</a:t>
             </a:r>
             <a:r>
-              <a:rPr lang="en-US" altLang="ja-JP">
+              <a:rPr lang="en-US" altLang="ja-JP" dirty="0">
                 <a:latin typeface="Calibri" charset="0"/>
                 <a:ea typeface="ＭＳ Ｐゴシック" charset="0"/>
               </a:rPr>
@@ -10503,14 +10517,14 @@
               </a:rPr>
               <a:t>’</a:t>
             </a:r>
-            <a:endParaRPr lang="en-US" altLang="ja-JP">
+            <a:endParaRPr lang="en-US" altLang="ja-JP" dirty="0">
               <a:latin typeface="Calibri" charset="0"/>
               <a:ea typeface="ＭＳ Ｐゴシック" charset="0"/>
             </a:endParaRPr>
           </a:p>
           <a:p>
             <a:r>
-              <a:rPr lang="en-US">
+              <a:rPr lang="en-US" dirty="0">
                 <a:latin typeface="Calibri" charset="0"/>
                 <a:ea typeface="ＭＳ Ｐゴシック" charset="0"/>
               </a:rPr>
@@ -10519,7 +10533,7 @@
           </a:p>
           <a:p>
             <a:r>
-              <a:rPr lang="en-US">
+              <a:rPr lang="en-US" dirty="0">
                 <a:latin typeface="Calibri" charset="0"/>
                 <a:ea typeface="ＭＳ Ｐゴシック" charset="0"/>
               </a:rPr>
@@ -10529,7 +10543,7 @@
           <a:p>
             <a:pPr lvl="1"/>
             <a:r>
-              <a:rPr lang="en-US">
+              <a:rPr lang="en-US" dirty="0">
                 <a:latin typeface="Calibri" charset="0"/>
                 <a:ea typeface="ＭＳ Ｐゴシック" charset="0"/>
               </a:rPr>
@@ -10543,7 +10557,7 @@
               <a:t>‘</a:t>
             </a:r>
             <a:r>
-              <a:rPr lang="en-US" altLang="ja-JP">
+              <a:rPr lang="en-US" altLang="ja-JP" dirty="0">
                 <a:latin typeface="Calibri" charset="0"/>
                 <a:ea typeface="ＭＳ Ｐゴシック" charset="0"/>
               </a:rPr>
@@ -10556,29 +10570,19 @@
               </a:rPr>
               <a:t>’</a:t>
             </a:r>
-            <a:endParaRPr lang="en-US" altLang="ja-JP">
+            <a:endParaRPr lang="en-US" altLang="ja-JP" dirty="0">
               <a:latin typeface="Calibri" charset="0"/>
               <a:ea typeface="ＭＳ Ｐゴシック" charset="0"/>
             </a:endParaRPr>
           </a:p>
           <a:p>
-            <a:pPr lvl="1"/>
-            <a:r>
-              <a:rPr lang="en-US">
-                <a:latin typeface="Calibri" charset="0"/>
-                <a:ea typeface="ＭＳ Ｐゴシック" charset="0"/>
-              </a:rPr>
-              <a:t>Answer a question [optional]</a:t>
-            </a:r>
-          </a:p>
-          <a:p>
-            <a:pPr lvl="1"/>
-            <a:r>
-              <a:rPr lang="en-US">
-                <a:latin typeface="Calibri" charset="0"/>
-                <a:ea typeface="ＭＳ Ｐゴシック" charset="0"/>
-              </a:rPr>
-              <a:t>Search for a topic area of interest and ask a question that has not already been asked [optional]</a:t>
+            <a:pPr lvl="2"/>
+            <a:r>
+              <a:rPr lang="en-US" altLang="ja-JP" dirty="0">
+                <a:latin typeface="Calibri" charset="0"/>
+                <a:ea typeface="ＭＳ Ｐゴシック" charset="0"/>
+              </a:rPr>
+              <a:t>E.g. search for a tool you have used, data type you are working with, etc.</a:t>
             </a:r>
           </a:p>
         </p:txBody>
@@ -11644,14 +11648,14 @@
           </a:ln>
           <a:extLst>
             <a:ext uri="{909E8E84-426E-40dd-AFC4-6F175D3DCCD1}">
-              <a14:hiddenFill xmlns="" xmlns:a14="http://schemas.microsoft.com/office/drawing/2010/main">
+              <a14:hiddenFill xmlns:a14="http://schemas.microsoft.com/office/drawing/2010/main" xmlns="">
                 <a:solidFill>
                   <a:srgbClr val="FFFFFF"/>
                 </a:solidFill>
               </a14:hiddenFill>
             </a:ext>
             <a:ext uri="{91240B29-F687-4f45-9708-019B960494DF}">
-              <a14:hiddenLine xmlns="" xmlns:a14="http://schemas.microsoft.com/office/drawing/2010/main" w="9525">
+              <a14:hiddenLine xmlns:a14="http://schemas.microsoft.com/office/drawing/2010/main" xmlns="" w="9525">
                 <a:solidFill>
                   <a:srgbClr val="000000"/>
                 </a:solidFill>
@@ -11813,14 +11817,14 @@
           </a:ln>
           <a:extLst>
             <a:ext uri="{909E8E84-426E-40dd-AFC4-6F175D3DCCD1}">
-              <a14:hiddenFill xmlns="" xmlns:a14="http://schemas.microsoft.com/office/drawing/2010/main">
+              <a14:hiddenFill xmlns:a14="http://schemas.microsoft.com/office/drawing/2010/main" xmlns="">
                 <a:solidFill>
                   <a:srgbClr val="FFFFFF"/>
                 </a:solidFill>
               </a14:hiddenFill>
             </a:ext>
             <a:ext uri="{91240B29-F687-4f45-9708-019B960494DF}">
-              <a14:hiddenLine xmlns="" xmlns:a14="http://schemas.microsoft.com/office/drawing/2010/main" w="9525">
+              <a14:hiddenLine xmlns:a14="http://schemas.microsoft.com/office/drawing/2010/main" xmlns="" w="9525">
                 <a:solidFill>
                   <a:srgbClr val="000000"/>
                 </a:solidFill>
@@ -12516,14 +12520,14 @@
           </a:ln>
           <a:extLst>
             <a:ext uri="{909E8E84-426E-40dd-AFC4-6F175D3DCCD1}">
-              <a14:hiddenFill xmlns="" xmlns:a14="http://schemas.microsoft.com/office/drawing/2010/main">
+              <a14:hiddenFill xmlns:a14="http://schemas.microsoft.com/office/drawing/2010/main" xmlns="">
                 <a:solidFill>
                   <a:srgbClr val="FFFFFF"/>
                 </a:solidFill>
               </a14:hiddenFill>
             </a:ext>
             <a:ext uri="{91240B29-F687-4f45-9708-019B960494DF}">
-              <a14:hiddenLine xmlns="" xmlns:a14="http://schemas.microsoft.com/office/drawing/2010/main" w="9525">
+              <a14:hiddenLine xmlns:a14="http://schemas.microsoft.com/office/drawing/2010/main" xmlns="" w="9525">
                 <a:solidFill>
                   <a:srgbClr val="000000"/>
                 </a:solidFill>

</xml_diff>